<commit_message>
Design Review Slides Ver. 2
Design Review Slides Ver. 2
</commit_message>
<xml_diff>
--- a/DesignReviewSlides.pptx
+++ b/DesignReviewSlides.pptx
@@ -130,7 +130,7 @@
   </p:defaultTextStyle>
   <p:extLst>
     <p:ext uri="{EFAFB233-063F-42B5-8137-9DF3F51BA10A}">
-      <p15:sldGuideLst xmlns:p15="http://schemas.microsoft.com/office/powerpoint/2012/main" xmlns=""/>
+      <p15:sldGuideLst xmlns="" xmlns:p15="http://schemas.microsoft.com/office/powerpoint/2012/main"/>
     </p:ext>
   </p:extLst>
 </p:presentation>
@@ -3929,6 +3929,13 @@
   <p:clrMapOvr>
     <a:masterClrMapping/>
   </p:clrMapOvr>
+  <p:timing>
+    <p:tnLst>
+      <p:par>
+        <p:cTn xmlns:p14="http://schemas.microsoft.com/office/powerpoint/2010/main" id="1" dur="indefinite" restart="never" nodeType="tmRoot"/>
+      </p:par>
+    </p:tnLst>
+  </p:timing>
 </p:sld>
 </file>
 
@@ -4394,6 +4401,13 @@
   <p:clrMapOvr>
     <a:masterClrMapping/>
   </p:clrMapOvr>
+  <p:timing>
+    <p:tnLst>
+      <p:par>
+        <p:cTn xmlns:p14="http://schemas.microsoft.com/office/powerpoint/2010/main" id="1" dur="indefinite" restart="never" nodeType="tmRoot"/>
+      </p:par>
+    </p:tnLst>
+  </p:timing>
 </p:sld>
 </file>
 
@@ -4481,6 +4495,13 @@
   <p:clrMapOvr>
     <a:masterClrMapping/>
   </p:clrMapOvr>
+  <p:timing>
+    <p:tnLst>
+      <p:par>
+        <p:cTn xmlns:p14="http://schemas.microsoft.com/office/powerpoint/2010/main" id="1" dur="indefinite" restart="never" nodeType="tmRoot"/>
+      </p:par>
+    </p:tnLst>
+  </p:timing>
 </p:sld>
 </file>
 
@@ -4576,6 +4597,13 @@
   <p:clrMapOvr>
     <a:masterClrMapping/>
   </p:clrMapOvr>
+  <p:timing>
+    <p:tnLst>
+      <p:par>
+        <p:cTn xmlns:p14="http://schemas.microsoft.com/office/powerpoint/2010/main" id="1" dur="indefinite" restart="never" nodeType="tmRoot"/>
+      </p:par>
+    </p:tnLst>
+  </p:timing>
 </p:sld>
 </file>
 
@@ -4663,6 +4691,13 @@
   <p:clrMapOvr>
     <a:masterClrMapping/>
   </p:clrMapOvr>
+  <p:timing>
+    <p:tnLst>
+      <p:par>
+        <p:cTn xmlns:p14="http://schemas.microsoft.com/office/powerpoint/2010/main" id="1" dur="indefinite" restart="never" nodeType="tmRoot"/>
+      </p:par>
+    </p:tnLst>
+  </p:timing>
 </p:sld>
 </file>
 
@@ -4716,6 +4751,13 @@
   <p:clrMapOvr>
     <a:masterClrMapping/>
   </p:clrMapOvr>
+  <p:timing>
+    <p:tnLst>
+      <p:par>
+        <p:cTn xmlns:p14="http://schemas.microsoft.com/office/powerpoint/2010/main" id="1" dur="indefinite" restart="never" nodeType="tmRoot"/>
+      </p:par>
+    </p:tnLst>
+  </p:timing>
 </p:sld>
 </file>
 
@@ -4770,7 +4812,6 @@
               <a:rPr lang="en-US" dirty="0"/>
               <a:t>Case Diagram</a:t>
             </a:r>
-            <a:endParaRPr lang="en-US" dirty="0"/>
           </a:p>
         </p:txBody>
       </p:sp>
@@ -4813,6 +4854,13 @@
   <p:clrMapOvr>
     <a:masterClrMapping/>
   </p:clrMapOvr>
+  <p:timing>
+    <p:tnLst>
+      <p:par>
+        <p:cTn xmlns:p14="http://schemas.microsoft.com/office/powerpoint/2010/main" id="1" dur="indefinite" restart="never" nodeType="tmRoot"/>
+      </p:par>
+    </p:tnLst>
+  </p:timing>
 </p:sld>
 </file>
 
@@ -4882,7 +4930,7 @@
           <a:graphicData uri="http://schemas.openxmlformats.org/presentationml/2006/ole">
             <mc:AlternateContent xmlns:mc="http://schemas.openxmlformats.org/markup-compatibility/2006">
               <mc:Choice xmlns:v="urn:schemas-microsoft-com:vml" Requires="v">
-                <p:oleObj spid="_x0000_s1044" name="Document" r:id="rId3" imgW="5626100" imgH="2387600" progId="Word.Document.12">
+                <p:oleObj spid="_x0000_s1067" name="Document" r:id="rId3" imgW="5626100" imgH="2387600" progId="Word.Document.12">
                   <p:embed/>
                 </p:oleObj>
               </mc:Choice>
@@ -4939,7 +4987,7 @@
           <a:graphicData uri="http://schemas.openxmlformats.org/presentationml/2006/ole">
             <mc:AlternateContent xmlns:mc="http://schemas.openxmlformats.org/markup-compatibility/2006">
               <mc:Choice xmlns:v="urn:schemas-microsoft-com:vml" Requires="v">
-                <p:oleObj spid="_x0000_s1045" name="Document" r:id="rId5" imgW="5626100" imgH="1943100" progId="Word.Document.12">
+                <p:oleObj spid="_x0000_s1068" name="Document" r:id="rId5" imgW="5626100" imgH="1943100" progId="Word.Document.12">
                   <p:embed/>
                 </p:oleObj>
               </mc:Choice>
@@ -4984,6 +5032,13 @@
   <p:clrMapOvr>
     <a:masterClrMapping/>
   </p:clrMapOvr>
+  <p:timing>
+    <p:tnLst>
+      <p:par>
+        <p:cTn xmlns:p14="http://schemas.microsoft.com/office/powerpoint/2010/main" id="1" dur="indefinite" restart="never" nodeType="tmRoot"/>
+      </p:par>
+    </p:tnLst>
+  </p:timing>
 </p:sld>
 </file>
 
@@ -5053,7 +5108,7 @@
           <a:graphicData uri="http://schemas.openxmlformats.org/presentationml/2006/ole">
             <mc:AlternateContent xmlns:mc="http://schemas.openxmlformats.org/markup-compatibility/2006">
               <mc:Choice xmlns:v="urn:schemas-microsoft-com:vml" Requires="v">
-                <p:oleObj spid="_x0000_s2063" name="Document" r:id="rId3" imgW="5626100" imgH="2565400" progId="Word.Document.12">
+                <p:oleObj spid="_x0000_s2086" name="Document" r:id="rId3" imgW="5626100" imgH="2565400" progId="Word.Document.12">
                   <p:embed/>
                 </p:oleObj>
               </mc:Choice>
@@ -5110,7 +5165,7 @@
           <a:graphicData uri="http://schemas.openxmlformats.org/presentationml/2006/ole">
             <mc:AlternateContent xmlns:mc="http://schemas.openxmlformats.org/markup-compatibility/2006">
               <mc:Choice xmlns:v="urn:schemas-microsoft-com:vml" Requires="v">
-                <p:oleObj spid="_x0000_s2064" name="Document" r:id="rId5" imgW="5626100" imgH="2146300" progId="Word.Document.12">
+                <p:oleObj spid="_x0000_s2087" name="Document" r:id="rId5" imgW="5626100" imgH="2146300" progId="Word.Document.12">
                   <p:embed/>
                 </p:oleObj>
               </mc:Choice>
@@ -5155,6 +5210,13 @@
   <p:clrMapOvr>
     <a:masterClrMapping/>
   </p:clrMapOvr>
+  <p:timing>
+    <p:tnLst>
+      <p:par>
+        <p:cTn xmlns:p14="http://schemas.microsoft.com/office/powerpoint/2010/main" id="1" dur="indefinite" restart="never" nodeType="tmRoot"/>
+      </p:par>
+    </p:tnLst>
+  </p:timing>
 </p:sld>
 </file>
 
@@ -5224,7 +5286,7 @@
           <a:graphicData uri="http://schemas.openxmlformats.org/presentationml/2006/ole">
             <mc:AlternateContent xmlns:mc="http://schemas.openxmlformats.org/markup-compatibility/2006">
               <mc:Choice xmlns:v="urn:schemas-microsoft-com:vml" Requires="v">
-                <p:oleObj spid="_x0000_s3079" name="Document" r:id="rId3" imgW="6083300" imgH="2984500" progId="Word.Document.12">
+                <p:oleObj spid="_x0000_s3102" name="Document" r:id="rId3" imgW="6083300" imgH="2984500" progId="Word.Document.12">
                   <p:embed/>
                 </p:oleObj>
               </mc:Choice>
@@ -5281,7 +5343,7 @@
           <a:graphicData uri="http://schemas.openxmlformats.org/presentationml/2006/ole">
             <mc:AlternateContent xmlns:mc="http://schemas.openxmlformats.org/markup-compatibility/2006">
               <mc:Choice xmlns:v="urn:schemas-microsoft-com:vml" Requires="v">
-                <p:oleObj spid="_x0000_s3080" name="Document" r:id="rId5" imgW="6083300" imgH="1943100" progId="Word.Document.12">
+                <p:oleObj spid="_x0000_s3103" name="Document" r:id="rId5" imgW="6083300" imgH="1943100" progId="Word.Document.12">
                   <p:embed/>
                 </p:oleObj>
               </mc:Choice>
@@ -5326,6 +5388,13 @@
   <p:clrMapOvr>
     <a:masterClrMapping/>
   </p:clrMapOvr>
+  <p:timing>
+    <p:tnLst>
+      <p:par>
+        <p:cTn xmlns:p14="http://schemas.microsoft.com/office/powerpoint/2010/main" id="1" dur="indefinite" restart="never" nodeType="tmRoot"/>
+      </p:par>
+    </p:tnLst>
+  </p:timing>
 </p:sld>
 </file>
 
@@ -5395,7 +5464,7 @@
           <a:graphicData uri="http://schemas.openxmlformats.org/presentationml/2006/ole">
             <mc:AlternateContent xmlns:mc="http://schemas.openxmlformats.org/markup-compatibility/2006">
               <mc:Choice xmlns:v="urn:schemas-microsoft-com:vml" Requires="v">
-                <p:oleObj spid="_x0000_s4101" name="Document" r:id="rId3" imgW="6083300" imgH="3098800" progId="Word.Document.12">
+                <p:oleObj spid="_x0000_s4124" name="Document" r:id="rId3" imgW="6083300" imgH="3098800" progId="Word.Document.12">
                   <p:embed/>
                 </p:oleObj>
               </mc:Choice>
@@ -5452,7 +5521,7 @@
           <a:graphicData uri="http://schemas.openxmlformats.org/presentationml/2006/ole">
             <mc:AlternateContent xmlns:mc="http://schemas.openxmlformats.org/markup-compatibility/2006">
               <mc:Choice xmlns:v="urn:schemas-microsoft-com:vml" Requires="v">
-                <p:oleObj spid="_x0000_s4102" name="Document" r:id="rId5" imgW="6083300" imgH="1803400" progId="Word.Document.12">
+                <p:oleObj spid="_x0000_s4125" name="Document" r:id="rId5" imgW="6083300" imgH="1803400" progId="Word.Document.12">
                   <p:embed/>
                 </p:oleObj>
               </mc:Choice>
@@ -5497,6 +5566,13 @@
   <p:clrMapOvr>
     <a:masterClrMapping/>
   </p:clrMapOvr>
+  <p:timing>
+    <p:tnLst>
+      <p:par>
+        <p:cTn xmlns:p14="http://schemas.microsoft.com/office/powerpoint/2010/main" id="1" dur="indefinite" restart="never" nodeType="tmRoot"/>
+      </p:par>
+    </p:tnLst>
+  </p:timing>
 </p:sld>
 </file>
 
@@ -5584,6 +5660,13 @@
   <p:clrMapOvr>
     <a:masterClrMapping/>
   </p:clrMapOvr>
+  <p:timing>
+    <p:tnLst>
+      <p:par>
+        <p:cTn xmlns:p14="http://schemas.microsoft.com/office/powerpoint/2010/main" id="1" dur="indefinite" restart="never" nodeType="tmRoot"/>
+      </p:par>
+    </p:tnLst>
+  </p:timing>
 </p:sld>
 </file>
 
@@ -5635,7 +5718,7 @@
       </p:sp>
       <p:pic>
         <p:nvPicPr>
-          <p:cNvPr id="3" name="Picture 2" descr="pic2.png"/>
+          <p:cNvPr id="4" name="Picture 3" descr="pic2.png"/>
           <p:cNvPicPr>
             <a:picLocks noChangeAspect="1"/>
           </p:cNvPicPr>
@@ -5649,13 +5732,13 @@
               </a:ext>
             </a:extLst>
           </a:blip>
-          <a:srcRect l="16797" t="21885" r="28273" b="24807"/>
+          <a:srcRect l="16328" t="21165" r="28026" b="24101"/>
           <a:stretch/>
         </p:blipFill>
         <p:spPr>
           <a:xfrm>
-            <a:off x="2386122" y="2065254"/>
-            <a:ext cx="7490112" cy="4104859"/>
+            <a:off x="2333301" y="2051885"/>
+            <a:ext cx="7470088" cy="4149192"/>
           </a:xfrm>
           <a:prstGeom prst="rect">
             <a:avLst/>
@@ -5672,6 +5755,13 @@
   <p:clrMapOvr>
     <a:masterClrMapping/>
   </p:clrMapOvr>
+  <p:timing>
+    <p:tnLst>
+      <p:par>
+        <p:cTn xmlns:p14="http://schemas.microsoft.com/office/powerpoint/2010/main" id="1" dur="indefinite" restart="never" nodeType="tmRoot"/>
+      </p:par>
+    </p:tnLst>
+  </p:timing>
 </p:sld>
 </file>
 
@@ -5740,7 +5830,7 @@
       </p:sp>
       <p:pic>
         <p:nvPicPr>
-          <p:cNvPr id="3" name="Picture 2" descr="pic5.png"/>
+          <p:cNvPr id="4" name="Picture 3" descr="pic5.png"/>
           <p:cNvPicPr>
             <a:picLocks noChangeAspect="1"/>
           </p:cNvPicPr>
@@ -5754,13 +5844,13 @@
               </a:ext>
             </a:extLst>
           </a:blip>
-          <a:srcRect l="24614" t="19827" r="48450" b="26865"/>
+          <a:srcRect l="21256" t="23246" r="40028" b="23960"/>
           <a:stretch/>
         </p:blipFill>
         <p:spPr>
           <a:xfrm>
-            <a:off x="4348903" y="2193533"/>
-            <a:ext cx="3271298" cy="3655890"/>
+            <a:off x="2864333" y="1783316"/>
+            <a:ext cx="6147512" cy="4733926"/>
           </a:xfrm>
           <a:prstGeom prst="rect">
             <a:avLst/>
@@ -5777,6 +5867,13 @@
   <p:clrMapOvr>
     <a:masterClrMapping/>
   </p:clrMapOvr>
+  <p:timing>
+    <p:tnLst>
+      <p:par>
+        <p:cTn xmlns:p14="http://schemas.microsoft.com/office/powerpoint/2010/main" id="1" dur="indefinite" restart="never" nodeType="tmRoot"/>
+      </p:par>
+    </p:tnLst>
+  </p:timing>
 </p:sld>
 </file>
 
@@ -5866,6 +5963,13 @@
   <p:clrMapOvr>
     <a:masterClrMapping/>
   </p:clrMapOvr>
+  <p:timing>
+    <p:tnLst>
+      <p:par>
+        <p:cTn xmlns:p14="http://schemas.microsoft.com/office/powerpoint/2010/main" id="1" dur="indefinite" restart="never" nodeType="tmRoot"/>
+      </p:par>
+    </p:tnLst>
+  </p:timing>
 </p:sld>
 </file>
 
@@ -5920,6 +6024,13 @@
   <p:clrMapOvr>
     <a:masterClrMapping/>
   </p:clrMapOvr>
+  <p:timing>
+    <p:tnLst>
+      <p:par>
+        <p:cTn xmlns:p14="http://schemas.microsoft.com/office/powerpoint/2010/main" id="1" dur="indefinite" restart="never" nodeType="tmRoot"/>
+      </p:par>
+    </p:tnLst>
+  </p:timing>
 </p:sld>
 </file>
 
@@ -6007,6 +6118,13 @@
   <p:clrMapOvr>
     <a:masterClrMapping/>
   </p:clrMapOvr>
+  <p:timing>
+    <p:tnLst>
+      <p:par>
+        <p:cTn xmlns:p14="http://schemas.microsoft.com/office/powerpoint/2010/main" id="1" dur="indefinite" restart="never" nodeType="tmRoot"/>
+      </p:par>
+    </p:tnLst>
+  </p:timing>
 </p:sld>
 </file>
 
@@ -6094,6 +6212,13 @@
   <p:clrMapOvr>
     <a:masterClrMapping/>
   </p:clrMapOvr>
+  <p:timing>
+    <p:tnLst>
+      <p:par>
+        <p:cTn xmlns:p14="http://schemas.microsoft.com/office/powerpoint/2010/main" id="1" dur="indefinite" restart="never" nodeType="tmRoot"/>
+      </p:par>
+    </p:tnLst>
+  </p:timing>
 </p:sld>
 </file>
 
@@ -6184,6 +6309,13 @@
   <p:clrMapOvr>
     <a:masterClrMapping/>
   </p:clrMapOvr>
+  <p:timing>
+    <p:tnLst>
+      <p:par>
+        <p:cTn xmlns:p14="http://schemas.microsoft.com/office/powerpoint/2010/main" id="1" dur="indefinite" restart="never" nodeType="tmRoot"/>
+      </p:par>
+    </p:tnLst>
+  </p:timing>
 </p:sld>
 </file>
 
@@ -6233,13 +6365,13 @@
       </p:sp>
       <p:pic>
         <p:nvPicPr>
-          <p:cNvPr id="4" name="Picture 3"/>
+          <p:cNvPr id="2" name="Picture 1" descr="pic6.png"/>
           <p:cNvPicPr>
             <a:picLocks noChangeAspect="1"/>
           </p:cNvPicPr>
           <p:nvPr/>
         </p:nvPicPr>
-        <p:blipFill>
+        <p:blipFill rotWithShape="1">
           <a:blip r:embed="rId2">
             <a:extLst>
               <a:ext uri="{28A0092B-C50C-407E-A947-70E740481C1C}">
@@ -6247,14 +6379,13 @@
               </a:ext>
             </a:extLst>
           </a:blip>
-          <a:stretch>
-            <a:fillRect/>
-          </a:stretch>
+          <a:srcRect l="14646" t="20505" r="34188" b="14179"/>
+          <a:stretch/>
         </p:blipFill>
         <p:spPr>
           <a:xfrm>
-            <a:off x="2091065" y="1744565"/>
-            <a:ext cx="6907883" cy="4847646"/>
+            <a:off x="3412967" y="1865902"/>
+            <a:ext cx="6519786" cy="4700088"/>
           </a:xfrm>
           <a:prstGeom prst="rect">
             <a:avLst/>
@@ -6271,6 +6402,13 @@
   <p:clrMapOvr>
     <a:masterClrMapping/>
   </p:clrMapOvr>
+  <p:timing>
+    <p:tnLst>
+      <p:par>
+        <p:cTn xmlns:p14="http://schemas.microsoft.com/office/powerpoint/2010/main" id="1" dur="indefinite" restart="never" nodeType="tmRoot"/>
+      </p:par>
+    </p:tnLst>
+  </p:timing>
 </p:sld>
 </file>
 
@@ -6358,6 +6496,13 @@
   <p:clrMapOvr>
     <a:masterClrMapping/>
   </p:clrMapOvr>
+  <p:timing>
+    <p:tnLst>
+      <p:par>
+        <p:cTn xmlns:p14="http://schemas.microsoft.com/office/powerpoint/2010/main" id="1" dur="indefinite" restart="never" nodeType="tmRoot"/>
+      </p:par>
+    </p:tnLst>
+  </p:timing>
 </p:sld>
 </file>
 
@@ -6453,6 +6598,13 @@
   <p:clrMapOvr>
     <a:masterClrMapping/>
   </p:clrMapOvr>
+  <p:timing>
+    <p:tnLst>
+      <p:par>
+        <p:cTn xmlns:p14="http://schemas.microsoft.com/office/powerpoint/2010/main" id="1" dur="indefinite" restart="never" nodeType="tmRoot"/>
+      </p:par>
+    </p:tnLst>
+  </p:timing>
 </p:sld>
 </file>
 
@@ -6507,6 +6659,13 @@
   <p:clrMapOvr>
     <a:masterClrMapping/>
   </p:clrMapOvr>
+  <p:timing>
+    <p:tnLst>
+      <p:par>
+        <p:cTn xmlns:p14="http://schemas.microsoft.com/office/powerpoint/2010/main" id="1" dur="indefinite" restart="never" nodeType="tmRoot"/>
+      </p:par>
+    </p:tnLst>
+  </p:timing>
 </p:sld>
 </file>
 
@@ -6594,6 +6753,13 @@
   <p:clrMapOvr>
     <a:masterClrMapping/>
   </p:clrMapOvr>
+  <p:timing>
+    <p:tnLst>
+      <p:par>
+        <p:cTn xmlns:p14="http://schemas.microsoft.com/office/powerpoint/2010/main" id="1" dur="indefinite" restart="never" nodeType="tmRoot"/>
+      </p:par>
+    </p:tnLst>
+  </p:timing>
 </p:sld>
 </file>
 
@@ -7048,7 +7214,6 @@
               <a:rPr lang="en-US" dirty="0"/>
               <a:t>Use Case Description: Set Speed</a:t>
             </a:r>
-            <a:endParaRPr lang="en-US" dirty="0"/>
           </a:p>
         </p:txBody>
       </p:sp>
@@ -7062,6 +7227,13 @@
   <p:clrMapOvr>
     <a:masterClrMapping/>
   </p:clrMapOvr>
+  <p:timing>
+    <p:tnLst>
+      <p:par>
+        <p:cTn xmlns:p14="http://schemas.microsoft.com/office/powerpoint/2010/main" id="1" dur="indefinite" restart="never" nodeType="tmRoot"/>
+      </p:par>
+    </p:tnLst>
+  </p:timing>
 </p:sld>
 </file>
 

</xml_diff>